<commit_message>
11/2/16 background, info, qc for sub data
</commit_message>
<xml_diff>
--- a/BackgroundInfo/Template for my presentation.pptx
+++ b/BackgroundInfo/Template for my presentation.pptx
@@ -2,28 +2,29 @@
 <file path=ppt/presentation.xml><?xml version="1.0" encoding="utf-8"?>
 <p:presentation xmlns:a="http://schemas.openxmlformats.org/drawingml/2006/main" xmlns:r="http://schemas.openxmlformats.org/officeDocument/2006/relationships" xmlns:p="http://schemas.openxmlformats.org/presentationml/2006/main" saveSubsetFonts="1">
   <p:sldMasterIdLst>
-    <p:sldMasterId id="2147483648" r:id="rId1"/>
+    <p:sldMasterId id="2147483660" r:id="rId1"/>
   </p:sldMasterIdLst>
   <p:sldIdLst>
     <p:sldId id="256" r:id="rId2"/>
     <p:sldId id="257" r:id="rId3"/>
-    <p:sldId id="259" r:id="rId4"/>
-    <p:sldId id="261" r:id="rId5"/>
-    <p:sldId id="262" r:id="rId6"/>
-    <p:sldId id="258" r:id="rId7"/>
-    <p:sldId id="260" r:id="rId8"/>
-    <p:sldId id="263" r:id="rId9"/>
-    <p:sldId id="264" r:id="rId10"/>
-    <p:sldId id="265" r:id="rId11"/>
-    <p:sldId id="266" r:id="rId12"/>
-    <p:sldId id="267" r:id="rId13"/>
-    <p:sldId id="268" r:id="rId14"/>
-    <p:sldId id="269" r:id="rId15"/>
-    <p:sldId id="270" r:id="rId16"/>
-    <p:sldId id="271" r:id="rId17"/>
-    <p:sldId id="272" r:id="rId18"/>
-    <p:sldId id="273" r:id="rId19"/>
-    <p:sldId id="274" r:id="rId20"/>
+    <p:sldId id="275" r:id="rId4"/>
+    <p:sldId id="259" r:id="rId5"/>
+    <p:sldId id="261" r:id="rId6"/>
+    <p:sldId id="262" r:id="rId7"/>
+    <p:sldId id="258" r:id="rId8"/>
+    <p:sldId id="260" r:id="rId9"/>
+    <p:sldId id="263" r:id="rId10"/>
+    <p:sldId id="264" r:id="rId11"/>
+    <p:sldId id="265" r:id="rId12"/>
+    <p:sldId id="266" r:id="rId13"/>
+    <p:sldId id="267" r:id="rId14"/>
+    <p:sldId id="268" r:id="rId15"/>
+    <p:sldId id="269" r:id="rId16"/>
+    <p:sldId id="270" r:id="rId17"/>
+    <p:sldId id="271" r:id="rId18"/>
+    <p:sldId id="272" r:id="rId19"/>
+    <p:sldId id="273" r:id="rId20"/>
+    <p:sldId id="274" r:id="rId21"/>
   </p:sldIdLst>
   <p:sldSz cx="12192000" cy="6858000"/>
   <p:notesSz cx="6858000" cy="9144000"/>
@@ -122,6 +123,11 @@
       </a:defRPr>
     </a:lvl9pPr>
   </p:defaultTextStyle>
+  <p:extLst>
+    <p:ext uri="{EFAFB233-063F-42B5-8137-9DF3F51BA10A}">
+      <p15:sldGuideLst xmlns:p15="http://schemas.microsoft.com/office/powerpoint/2012/main"/>
+    </p:ext>
+  </p:extLst>
 </p:presentation>
 </file>
 
@@ -170,7 +176,7 @@
               <a:rPr lang="en-US" smtClean="0"/>
               <a:t>Click to edit Master title style</a:t>
             </a:r>
-            <a:endParaRPr lang="en-AU"/>
+            <a:endParaRPr lang="en-US" dirty="0"/>
           </a:p>
         </p:txBody>
       </p:sp>
@@ -235,7 +241,7 @@
               <a:rPr lang="en-US" smtClean="0"/>
               <a:t>Click to edit Master subtitle style</a:t>
             </a:r>
-            <a:endParaRPr lang="en-AU"/>
+            <a:endParaRPr lang="en-US" dirty="0"/>
           </a:p>
         </p:txBody>
       </p:sp>
@@ -256,7 +262,7 @@
           <a:p>
             <a:fld id="{9D7F6470-0706-4AC3-9475-B1AD87F940D0}" type="datetimeFigureOut">
               <a:rPr lang="en-AU" smtClean="0"/>
-              <a:t>5/02/2016</a:t>
+              <a:t>11/02/2016</a:t>
             </a:fld>
             <a:endParaRPr lang="en-AU"/>
           </a:p>
@@ -307,7 +313,7 @@
     </p:spTree>
     <p:extLst>
       <p:ext uri="{BB962C8B-B14F-4D97-AF65-F5344CB8AC3E}">
-        <p14:creationId xmlns:p14="http://schemas.microsoft.com/office/powerpoint/2010/main" val="1052996596"/>
+        <p14:creationId xmlns:p14="http://schemas.microsoft.com/office/powerpoint/2010/main" val="44591012"/>
       </p:ext>
     </p:extLst>
   </p:cSld>
@@ -353,7 +359,7 @@
               <a:rPr lang="en-US" smtClean="0"/>
               <a:t>Click to edit Master title style</a:t>
             </a:r>
-            <a:endParaRPr lang="en-AU"/>
+            <a:endParaRPr lang="en-US" dirty="0"/>
           </a:p>
         </p:txBody>
       </p:sp>
@@ -405,7 +411,7 @@
               <a:rPr lang="en-US" smtClean="0"/>
               <a:t>Fifth level</a:t>
             </a:r>
-            <a:endParaRPr lang="en-AU"/>
+            <a:endParaRPr lang="en-US" dirty="0"/>
           </a:p>
         </p:txBody>
       </p:sp>
@@ -426,7 +432,7 @@
           <a:p>
             <a:fld id="{9D7F6470-0706-4AC3-9475-B1AD87F940D0}" type="datetimeFigureOut">
               <a:rPr lang="en-AU" smtClean="0"/>
-              <a:t>5/02/2016</a:t>
+              <a:t>11/02/2016</a:t>
             </a:fld>
             <a:endParaRPr lang="en-AU"/>
           </a:p>
@@ -477,7 +483,7 @@
     </p:spTree>
     <p:extLst>
       <p:ext uri="{BB962C8B-B14F-4D97-AF65-F5344CB8AC3E}">
-        <p14:creationId xmlns:p14="http://schemas.microsoft.com/office/powerpoint/2010/main" val="2938061018"/>
+        <p14:creationId xmlns:p14="http://schemas.microsoft.com/office/powerpoint/2010/main" val="2048806748"/>
       </p:ext>
     </p:extLst>
   </p:cSld>
@@ -528,7 +534,7 @@
               <a:rPr lang="en-US" smtClean="0"/>
               <a:t>Click to edit Master title style</a:t>
             </a:r>
-            <a:endParaRPr lang="en-AU"/>
+            <a:endParaRPr lang="en-US" dirty="0"/>
           </a:p>
         </p:txBody>
       </p:sp>
@@ -585,7 +591,7 @@
               <a:rPr lang="en-US" smtClean="0"/>
               <a:t>Fifth level</a:t>
             </a:r>
-            <a:endParaRPr lang="en-AU"/>
+            <a:endParaRPr lang="en-US" dirty="0"/>
           </a:p>
         </p:txBody>
       </p:sp>
@@ -606,7 +612,7 @@
           <a:p>
             <a:fld id="{9D7F6470-0706-4AC3-9475-B1AD87F940D0}" type="datetimeFigureOut">
               <a:rPr lang="en-AU" smtClean="0"/>
-              <a:t>5/02/2016</a:t>
+              <a:t>11/02/2016</a:t>
             </a:fld>
             <a:endParaRPr lang="en-AU"/>
           </a:p>
@@ -657,7 +663,7 @@
     </p:spTree>
     <p:extLst>
       <p:ext uri="{BB962C8B-B14F-4D97-AF65-F5344CB8AC3E}">
-        <p14:creationId xmlns:p14="http://schemas.microsoft.com/office/powerpoint/2010/main" val="1946514437"/>
+        <p14:creationId xmlns:p14="http://schemas.microsoft.com/office/powerpoint/2010/main" val="3086647864"/>
       </p:ext>
     </p:extLst>
   </p:cSld>
@@ -703,7 +709,7 @@
               <a:rPr lang="en-US" smtClean="0"/>
               <a:t>Click to edit Master title style</a:t>
             </a:r>
-            <a:endParaRPr lang="en-AU"/>
+            <a:endParaRPr lang="en-US" dirty="0"/>
           </a:p>
         </p:txBody>
       </p:sp>
@@ -755,7 +761,7 @@
               <a:rPr lang="en-US" smtClean="0"/>
               <a:t>Fifth level</a:t>
             </a:r>
-            <a:endParaRPr lang="en-AU"/>
+            <a:endParaRPr lang="en-US" dirty="0"/>
           </a:p>
         </p:txBody>
       </p:sp>
@@ -776,7 +782,7 @@
           <a:p>
             <a:fld id="{9D7F6470-0706-4AC3-9475-B1AD87F940D0}" type="datetimeFigureOut">
               <a:rPr lang="en-AU" smtClean="0"/>
-              <a:t>5/02/2016</a:t>
+              <a:t>11/02/2016</a:t>
             </a:fld>
             <a:endParaRPr lang="en-AU"/>
           </a:p>
@@ -827,7 +833,7 @@
     </p:spTree>
     <p:extLst>
       <p:ext uri="{BB962C8B-B14F-4D97-AF65-F5344CB8AC3E}">
-        <p14:creationId xmlns:p14="http://schemas.microsoft.com/office/powerpoint/2010/main" val="4131011099"/>
+        <p14:creationId xmlns:p14="http://schemas.microsoft.com/office/powerpoint/2010/main" val="3031135557"/>
       </p:ext>
     </p:extLst>
   </p:cSld>
@@ -882,7 +888,7 @@
               <a:rPr lang="en-US" smtClean="0"/>
               <a:t>Click to edit Master title style</a:t>
             </a:r>
-            <a:endParaRPr lang="en-AU"/>
+            <a:endParaRPr lang="en-US" dirty="0"/>
           </a:p>
         </p:txBody>
       </p:sp>
@@ -1022,7 +1028,7 @@
           <a:p>
             <a:fld id="{9D7F6470-0706-4AC3-9475-B1AD87F940D0}" type="datetimeFigureOut">
               <a:rPr lang="en-AU" smtClean="0"/>
-              <a:t>5/02/2016</a:t>
+              <a:t>11/02/2016</a:t>
             </a:fld>
             <a:endParaRPr lang="en-AU"/>
           </a:p>
@@ -1073,7 +1079,7 @@
     </p:spTree>
     <p:extLst>
       <p:ext uri="{BB962C8B-B14F-4D97-AF65-F5344CB8AC3E}">
-        <p14:creationId xmlns:p14="http://schemas.microsoft.com/office/powerpoint/2010/main" val="4102955174"/>
+        <p14:creationId xmlns:p14="http://schemas.microsoft.com/office/powerpoint/2010/main" val="1269859880"/>
       </p:ext>
     </p:extLst>
   </p:cSld>
@@ -1119,7 +1125,7 @@
               <a:rPr lang="en-US" smtClean="0"/>
               <a:t>Click to edit Master title style</a:t>
             </a:r>
-            <a:endParaRPr lang="en-AU"/>
+            <a:endParaRPr lang="en-US" dirty="0"/>
           </a:p>
         </p:txBody>
       </p:sp>
@@ -1176,7 +1182,7 @@
               <a:rPr lang="en-US" smtClean="0"/>
               <a:t>Fifth level</a:t>
             </a:r>
-            <a:endParaRPr lang="en-AU"/>
+            <a:endParaRPr lang="en-US" dirty="0"/>
           </a:p>
         </p:txBody>
       </p:sp>
@@ -1233,7 +1239,7 @@
               <a:rPr lang="en-US" smtClean="0"/>
               <a:t>Fifth level</a:t>
             </a:r>
-            <a:endParaRPr lang="en-AU"/>
+            <a:endParaRPr lang="en-US" dirty="0"/>
           </a:p>
         </p:txBody>
       </p:sp>
@@ -1254,7 +1260,7 @@
           <a:p>
             <a:fld id="{9D7F6470-0706-4AC3-9475-B1AD87F940D0}" type="datetimeFigureOut">
               <a:rPr lang="en-AU" smtClean="0"/>
-              <a:t>5/02/2016</a:t>
+              <a:t>11/02/2016</a:t>
             </a:fld>
             <a:endParaRPr lang="en-AU"/>
           </a:p>
@@ -1305,7 +1311,7 @@
     </p:spTree>
     <p:extLst>
       <p:ext uri="{BB962C8B-B14F-4D97-AF65-F5344CB8AC3E}">
-        <p14:creationId xmlns:p14="http://schemas.microsoft.com/office/powerpoint/2010/main" val="1339038629"/>
+        <p14:creationId xmlns:p14="http://schemas.microsoft.com/office/powerpoint/2010/main" val="3547083919"/>
       </p:ext>
     </p:extLst>
   </p:cSld>
@@ -1356,7 +1362,7 @@
               <a:rPr lang="en-US" smtClean="0"/>
               <a:t>Click to edit Master title style</a:t>
             </a:r>
-            <a:endParaRPr lang="en-AU"/>
+            <a:endParaRPr lang="en-US" dirty="0"/>
           </a:p>
         </p:txBody>
       </p:sp>
@@ -1478,7 +1484,7 @@
               <a:rPr lang="en-US" smtClean="0"/>
               <a:t>Fifth level</a:t>
             </a:r>
-            <a:endParaRPr lang="en-AU"/>
+            <a:endParaRPr lang="en-US" dirty="0"/>
           </a:p>
         </p:txBody>
       </p:sp>
@@ -1600,7 +1606,7 @@
               <a:rPr lang="en-US" smtClean="0"/>
               <a:t>Fifth level</a:t>
             </a:r>
-            <a:endParaRPr lang="en-AU"/>
+            <a:endParaRPr lang="en-US" dirty="0"/>
           </a:p>
         </p:txBody>
       </p:sp>
@@ -1621,7 +1627,7 @@
           <a:p>
             <a:fld id="{9D7F6470-0706-4AC3-9475-B1AD87F940D0}" type="datetimeFigureOut">
               <a:rPr lang="en-AU" smtClean="0"/>
-              <a:t>5/02/2016</a:t>
+              <a:t>11/02/2016</a:t>
             </a:fld>
             <a:endParaRPr lang="en-AU"/>
           </a:p>
@@ -1672,7 +1678,7 @@
     </p:spTree>
     <p:extLst>
       <p:ext uri="{BB962C8B-B14F-4D97-AF65-F5344CB8AC3E}">
-        <p14:creationId xmlns:p14="http://schemas.microsoft.com/office/powerpoint/2010/main" val="2168376258"/>
+        <p14:creationId xmlns:p14="http://schemas.microsoft.com/office/powerpoint/2010/main" val="2474082619"/>
       </p:ext>
     </p:extLst>
   </p:cSld>
@@ -1718,7 +1724,7 @@
               <a:rPr lang="en-US" smtClean="0"/>
               <a:t>Click to edit Master title style</a:t>
             </a:r>
-            <a:endParaRPr lang="en-AU"/>
+            <a:endParaRPr lang="en-US" dirty="0"/>
           </a:p>
         </p:txBody>
       </p:sp>
@@ -1739,7 +1745,7 @@
           <a:p>
             <a:fld id="{9D7F6470-0706-4AC3-9475-B1AD87F940D0}" type="datetimeFigureOut">
               <a:rPr lang="en-AU" smtClean="0"/>
-              <a:t>5/02/2016</a:t>
+              <a:t>11/02/2016</a:t>
             </a:fld>
             <a:endParaRPr lang="en-AU"/>
           </a:p>
@@ -1790,7 +1796,7 @@
     </p:spTree>
     <p:extLst>
       <p:ext uri="{BB962C8B-B14F-4D97-AF65-F5344CB8AC3E}">
-        <p14:creationId xmlns:p14="http://schemas.microsoft.com/office/powerpoint/2010/main" val="2590079673"/>
+        <p14:creationId xmlns:p14="http://schemas.microsoft.com/office/powerpoint/2010/main" val="1670022557"/>
       </p:ext>
     </p:extLst>
   </p:cSld>
@@ -1834,7 +1840,7 @@
           <a:p>
             <a:fld id="{9D7F6470-0706-4AC3-9475-B1AD87F940D0}" type="datetimeFigureOut">
               <a:rPr lang="en-AU" smtClean="0"/>
-              <a:t>5/02/2016</a:t>
+              <a:t>11/02/2016</a:t>
             </a:fld>
             <a:endParaRPr lang="en-AU"/>
           </a:p>
@@ -1885,7 +1891,7 @@
     </p:spTree>
     <p:extLst>
       <p:ext uri="{BB962C8B-B14F-4D97-AF65-F5344CB8AC3E}">
-        <p14:creationId xmlns:p14="http://schemas.microsoft.com/office/powerpoint/2010/main" val="749949148"/>
+        <p14:creationId xmlns:p14="http://schemas.microsoft.com/office/powerpoint/2010/main" val="179182885"/>
       </p:ext>
     </p:extLst>
   </p:cSld>
@@ -1940,7 +1946,7 @@
               <a:rPr lang="en-US" smtClean="0"/>
               <a:t>Click to edit Master title style</a:t>
             </a:r>
-            <a:endParaRPr lang="en-AU"/>
+            <a:endParaRPr lang="en-US" dirty="0"/>
           </a:p>
         </p:txBody>
       </p:sp>
@@ -2025,7 +2031,7 @@
               <a:rPr lang="en-US" smtClean="0"/>
               <a:t>Fifth level</a:t>
             </a:r>
-            <a:endParaRPr lang="en-AU"/>
+            <a:endParaRPr lang="en-US" dirty="0"/>
           </a:p>
         </p:txBody>
       </p:sp>
@@ -2111,7 +2117,7 @@
           <a:p>
             <a:fld id="{9D7F6470-0706-4AC3-9475-B1AD87F940D0}" type="datetimeFigureOut">
               <a:rPr lang="en-AU" smtClean="0"/>
-              <a:t>5/02/2016</a:t>
+              <a:t>11/02/2016</a:t>
             </a:fld>
             <a:endParaRPr lang="en-AU"/>
           </a:p>
@@ -2162,7 +2168,7 @@
     </p:spTree>
     <p:extLst>
       <p:ext uri="{BB962C8B-B14F-4D97-AF65-F5344CB8AC3E}">
-        <p14:creationId xmlns:p14="http://schemas.microsoft.com/office/powerpoint/2010/main" val="4232180491"/>
+        <p14:creationId xmlns:p14="http://schemas.microsoft.com/office/powerpoint/2010/main" val="2388775112"/>
       </p:ext>
     </p:extLst>
   </p:cSld>
@@ -2217,7 +2223,7 @@
               <a:rPr lang="en-US" smtClean="0"/>
               <a:t>Click to edit Master title style</a:t>
             </a:r>
-            <a:endParaRPr lang="en-AU"/>
+            <a:endParaRPr lang="en-US" dirty="0"/>
           </a:p>
         </p:txBody>
       </p:sp>
@@ -2225,7 +2231,7 @@
         <p:nvSpPr>
           <p:cNvPr id="3" name="Picture Placeholder 2"/>
           <p:cNvSpPr>
-            <a:spLocks noGrp="1"/>
+            <a:spLocks noGrp="1" noChangeAspect="1"/>
           </p:cNvSpPr>
           <p:nvPr>
             <p:ph type="pic" idx="1"/>
@@ -2238,7 +2244,7 @@
           </a:xfrm>
         </p:spPr>
         <p:txBody>
-          <a:bodyPr/>
+          <a:bodyPr anchor="t"/>
           <a:lstStyle>
             <a:lvl1pPr marL="0" indent="0">
               <a:buNone/>
@@ -2278,7 +2284,11 @@
             </a:lvl9pPr>
           </a:lstStyle>
           <a:p>
-            <a:endParaRPr lang="en-AU"/>
+            <a:r>
+              <a:rPr lang="en-US" smtClean="0"/>
+              <a:t>Click icon to add picture</a:t>
+            </a:r>
+            <a:endParaRPr lang="en-US" dirty="0"/>
           </a:p>
         </p:txBody>
       </p:sp>
@@ -2364,7 +2374,7 @@
           <a:p>
             <a:fld id="{9D7F6470-0706-4AC3-9475-B1AD87F940D0}" type="datetimeFigureOut">
               <a:rPr lang="en-AU" smtClean="0"/>
-              <a:t>5/02/2016</a:t>
+              <a:t>11/02/2016</a:t>
             </a:fld>
             <a:endParaRPr lang="en-AU"/>
           </a:p>
@@ -2415,7 +2425,7 @@
     </p:spTree>
     <p:extLst>
       <p:ext uri="{BB962C8B-B14F-4D97-AF65-F5344CB8AC3E}">
-        <p14:creationId xmlns:p14="http://schemas.microsoft.com/office/powerpoint/2010/main" val="1437603283"/>
+        <p14:creationId xmlns:p14="http://schemas.microsoft.com/office/powerpoint/2010/main" val="3565348891"/>
       </p:ext>
     </p:extLst>
   </p:cSld>
@@ -2476,7 +2486,7 @@
               <a:rPr lang="en-US" smtClean="0"/>
               <a:t>Click to edit Master title style</a:t>
             </a:r>
-            <a:endParaRPr lang="en-AU"/>
+            <a:endParaRPr lang="en-US" dirty="0"/>
           </a:p>
         </p:txBody>
       </p:sp>
@@ -2538,7 +2548,7 @@
               <a:rPr lang="en-US" smtClean="0"/>
               <a:t>Fifth level</a:t>
             </a:r>
-            <a:endParaRPr lang="en-AU"/>
+            <a:endParaRPr lang="en-US" dirty="0"/>
           </a:p>
         </p:txBody>
       </p:sp>
@@ -2577,7 +2587,7 @@
           <a:p>
             <a:fld id="{9D7F6470-0706-4AC3-9475-B1AD87F940D0}" type="datetimeFigureOut">
               <a:rPr lang="en-AU" smtClean="0"/>
-              <a:t>5/02/2016</a:t>
+              <a:t>11/02/2016</a:t>
             </a:fld>
             <a:endParaRPr lang="en-AU"/>
           </a:p>
@@ -2664,23 +2674,23 @@
     </p:spTree>
     <p:extLst>
       <p:ext uri="{BB962C8B-B14F-4D97-AF65-F5344CB8AC3E}">
-        <p14:creationId xmlns:p14="http://schemas.microsoft.com/office/powerpoint/2010/main" val="666744812"/>
+        <p14:creationId xmlns:p14="http://schemas.microsoft.com/office/powerpoint/2010/main" val="971148747"/>
       </p:ext>
     </p:extLst>
   </p:cSld>
-  <p:clrMap bg1="lt1" tx1="dk1" bg2="lt2" tx2="dk2" accent1="accent1" accent2="accent2" accent3="accent3" accent4="accent4" accent5="accent5" accent6="accent6" hlink="hlink" folHlink="folHlink"/>
+  <p:clrMap bg1="dk1" tx1="lt1" bg2="dk2" tx2="lt2" accent1="accent1" accent2="accent2" accent3="accent3" accent4="accent4" accent5="accent5" accent6="accent6" hlink="hlink" folHlink="folHlink"/>
   <p:sldLayoutIdLst>
-    <p:sldLayoutId id="2147483649" r:id="rId1"/>
-    <p:sldLayoutId id="2147483650" r:id="rId2"/>
-    <p:sldLayoutId id="2147483651" r:id="rId3"/>
-    <p:sldLayoutId id="2147483652" r:id="rId4"/>
-    <p:sldLayoutId id="2147483653" r:id="rId5"/>
-    <p:sldLayoutId id="2147483654" r:id="rId6"/>
-    <p:sldLayoutId id="2147483655" r:id="rId7"/>
-    <p:sldLayoutId id="2147483656" r:id="rId8"/>
-    <p:sldLayoutId id="2147483657" r:id="rId9"/>
-    <p:sldLayoutId id="2147483658" r:id="rId10"/>
-    <p:sldLayoutId id="2147483659" r:id="rId11"/>
+    <p:sldLayoutId id="2147483661" r:id="rId1"/>
+    <p:sldLayoutId id="2147483662" r:id="rId2"/>
+    <p:sldLayoutId id="2147483663" r:id="rId3"/>
+    <p:sldLayoutId id="2147483664" r:id="rId4"/>
+    <p:sldLayoutId id="2147483665" r:id="rId5"/>
+    <p:sldLayoutId id="2147483666" r:id="rId6"/>
+    <p:sldLayoutId id="2147483667" r:id="rId7"/>
+    <p:sldLayoutId id="2147483668" r:id="rId8"/>
+    <p:sldLayoutId id="2147483669" r:id="rId9"/>
+    <p:sldLayoutId id="2147483670" r:id="rId10"/>
+    <p:sldLayoutId id="2147483671" r:id="rId11"/>
   </p:sldLayoutIdLst>
   <p:txStyles>
     <p:titleStyle>
@@ -2968,6 +2978,20 @@
 <file path=ppt/slides/slide1.xml><?xml version="1.0" encoding="utf-8"?>
 <p:sld xmlns:a="http://schemas.openxmlformats.org/drawingml/2006/main" xmlns:r="http://schemas.openxmlformats.org/officeDocument/2006/relationships" xmlns:p="http://schemas.openxmlformats.org/presentationml/2006/main">
   <p:cSld>
+    <p:bg>
+      <p:bgPr>
+        <a:blipFill dpi="0" rotWithShape="1">
+          <a:blip r:embed="rId2">
+            <a:lum/>
+          </a:blip>
+          <a:srcRect/>
+          <a:stretch>
+            <a:fillRect t="-31000" b="-31000"/>
+          </a:stretch>
+        </a:blipFill>
+        <a:effectLst/>
+      </p:bgPr>
+    </p:bg>
     <p:spTree>
       <p:nvGrpSpPr>
         <p:cNvPr id="1" name=""/>
@@ -2992,35 +3016,78 @@
             <p:ph type="ctrTitle"/>
           </p:nvPr>
         </p:nvSpPr>
-        <p:spPr/>
-        <p:txBody>
-          <a:bodyPr/>
-          <a:lstStyle/>
-          <a:p>
+        <p:spPr>
+          <a:xfrm>
+            <a:off x="1801586" y="534535"/>
+            <a:ext cx="9144000" cy="2387600"/>
+          </a:xfrm>
+        </p:spPr>
+        <p:txBody>
+          <a:bodyPr/>
+          <a:lstStyle/>
+          <a:p>
+            <a:r>
+              <a:rPr lang="en-US" b="1" dirty="0" smtClean="0"/>
+              <a:t>Selective Export of miRNAs in Prostate Cancer</a:t>
+            </a:r>
+            <a:endParaRPr lang="en-AU" b="1" dirty="0"/>
+          </a:p>
+        </p:txBody>
+      </p:sp>
+      <p:sp>
+        <p:nvSpPr>
+          <p:cNvPr id="3" name="Subtitle 2"/>
+          <p:cNvSpPr>
+            <a:spLocks noGrp="1"/>
+          </p:cNvSpPr>
+          <p:nvPr>
+            <p:ph type="subTitle" idx="1"/>
+          </p:nvPr>
+        </p:nvSpPr>
+        <p:spPr>
+          <a:xfrm>
+            <a:off x="1670957" y="3918857"/>
+            <a:ext cx="9144000" cy="2188028"/>
+          </a:xfrm>
+        </p:spPr>
+        <p:txBody>
+          <a:bodyPr>
+            <a:normAutofit lnSpcReduction="10000"/>
+          </a:bodyPr>
+          <a:lstStyle/>
+          <a:p>
+            <a:pPr algn="l"/>
             <a:r>
               <a:rPr lang="en-US" dirty="0" smtClean="0"/>
-              <a:t>Selective Export of miRNAs in Prostate Cancer</a:t>
-            </a:r>
-            <a:endParaRPr lang="en-AU" dirty="0"/>
-          </a:p>
-        </p:txBody>
-      </p:sp>
-      <p:sp>
-        <p:nvSpPr>
-          <p:cNvPr id="3" name="Subtitle 2"/>
-          <p:cNvSpPr>
-            <a:spLocks noGrp="1"/>
-          </p:cNvSpPr>
-          <p:nvPr>
-            <p:ph type="subTitle" idx="1"/>
-          </p:nvPr>
-        </p:nvSpPr>
-        <p:spPr/>
-        <p:txBody>
-          <a:bodyPr/>
-          <a:lstStyle/>
-          <a:p>
-            <a:endParaRPr lang="en-AU" dirty="0"/>
+              <a:t>Harley Robinson</a:t>
+            </a:r>
+          </a:p>
+          <a:p>
+            <a:pPr algn="l"/>
+            <a:endParaRPr lang="en-US" dirty="0"/>
+          </a:p>
+          <a:p>
+            <a:pPr algn="l"/>
+            <a:endParaRPr lang="en-US" dirty="0"/>
+          </a:p>
+          <a:p>
+            <a:pPr algn="l"/>
+            <a:r>
+              <a:rPr lang="en-US" dirty="0" smtClean="0"/>
+              <a:t>Supervisor: Michelle Hill</a:t>
+            </a:r>
+          </a:p>
+          <a:p>
+            <a:pPr algn="l"/>
+            <a:r>
+              <a:rPr lang="en-US" dirty="0" smtClean="0"/>
+              <a:t>Co-supervisor: Alex </a:t>
+            </a:r>
+            <a:r>
+              <a:rPr lang="en-US" dirty="0" err="1" smtClean="0"/>
+              <a:t>Cristino</a:t>
+            </a:r>
+            <a:endParaRPr lang="en-US" dirty="0" smtClean="0"/>
           </a:p>
         </p:txBody>
       </p:sp>
@@ -3034,6 +3101,13 @@
   <p:clrMapOvr>
     <a:masterClrMapping/>
   </p:clrMapOvr>
+  <p:timing>
+    <p:tnLst>
+      <p:par>
+        <p:cTn id="1" dur="indefinite" restart="never" nodeType="tmRoot"/>
+      </p:par>
+    </p:tnLst>
+  </p:timing>
 </p:sld>
 </file>
 
@@ -3071,7 +3145,7 @@
           <a:p>
             <a:r>
               <a:rPr lang="en-US" dirty="0" smtClean="0"/>
-              <a:t>Aims</a:t>
+              <a:t>Hypothesis</a:t>
             </a:r>
             <a:endParaRPr lang="en-AU" dirty="0"/>
           </a:p>
@@ -3092,24 +3166,27 @@
           <a:bodyPr/>
           <a:lstStyle/>
           <a:p>
-            <a:r>
-              <a:rPr lang="en-US" dirty="0" smtClean="0"/>
-              <a:t>State the three aims.</a:t>
-            </a:r>
-            <a:endParaRPr lang="en-AU" dirty="0"/>
+            <a:endParaRPr lang="en-AU"/>
           </a:p>
         </p:txBody>
       </p:sp>
     </p:spTree>
     <p:extLst>
       <p:ext uri="{BB962C8B-B14F-4D97-AF65-F5344CB8AC3E}">
-        <p14:creationId xmlns:p14="http://schemas.microsoft.com/office/powerpoint/2010/main" val="4256728756"/>
+        <p14:creationId xmlns:p14="http://schemas.microsoft.com/office/powerpoint/2010/main" val="1151147403"/>
       </p:ext>
     </p:extLst>
   </p:cSld>
   <p:clrMapOvr>
     <a:masterClrMapping/>
   </p:clrMapOvr>
+  <p:timing>
+    <p:tnLst>
+      <p:par>
+        <p:cTn id="1" dur="indefinite" restart="never" nodeType="tmRoot"/>
+      </p:par>
+    </p:tnLst>
+  </p:timing>
 </p:sld>
 </file>
 
@@ -3145,6 +3222,10 @@
           <a:bodyPr/>
           <a:lstStyle/>
           <a:p>
+            <a:r>
+              <a:rPr lang="en-US" dirty="0" smtClean="0"/>
+              <a:t>Aims</a:t>
+            </a:r>
             <a:endParaRPr lang="en-AU" dirty="0"/>
           </a:p>
         </p:txBody>
@@ -3166,7 +3247,7 @@
           <a:p>
             <a:r>
               <a:rPr lang="en-US" dirty="0" smtClean="0"/>
-              <a:t>Slide on PC3 cells </a:t>
+              <a:t>State the three aims.</a:t>
             </a:r>
             <a:endParaRPr lang="en-AU" dirty="0"/>
           </a:p>
@@ -3175,13 +3256,20 @@
     </p:spTree>
     <p:extLst>
       <p:ext uri="{BB962C8B-B14F-4D97-AF65-F5344CB8AC3E}">
-        <p14:creationId xmlns:p14="http://schemas.microsoft.com/office/powerpoint/2010/main" val="4112382453"/>
+        <p14:creationId xmlns:p14="http://schemas.microsoft.com/office/powerpoint/2010/main" val="4256728756"/>
       </p:ext>
     </p:extLst>
   </p:cSld>
   <p:clrMapOvr>
     <a:masterClrMapping/>
   </p:clrMapOvr>
+  <p:timing>
+    <p:tnLst>
+      <p:par>
+        <p:cTn id="1" dur="indefinite" restart="never" nodeType="tmRoot"/>
+      </p:par>
+    </p:tnLst>
+  </p:timing>
 </p:sld>
 </file>
 
@@ -3217,49 +3305,29 @@
           <a:bodyPr/>
           <a:lstStyle/>
           <a:p>
+            <a:endParaRPr lang="en-AU" dirty="0"/>
+          </a:p>
+        </p:txBody>
+      </p:sp>
+      <p:sp>
+        <p:nvSpPr>
+          <p:cNvPr id="3" name="Content Placeholder 2"/>
+          <p:cNvSpPr>
+            <a:spLocks noGrp="1"/>
+          </p:cNvSpPr>
+          <p:nvPr>
+            <p:ph idx="1"/>
+          </p:nvPr>
+        </p:nvSpPr>
+        <p:spPr/>
+        <p:txBody>
+          <a:bodyPr/>
+          <a:lstStyle/>
+          <a:p>
             <a:r>
               <a:rPr lang="en-US" dirty="0" smtClean="0"/>
-              <a:t>Methods- Aim1.</a:t>
-            </a:r>
-            <a:endParaRPr lang="en-AU" dirty="0"/>
-          </a:p>
-        </p:txBody>
-      </p:sp>
-      <p:sp>
-        <p:nvSpPr>
-          <p:cNvPr id="3" name="Content Placeholder 2"/>
-          <p:cNvSpPr>
-            <a:spLocks noGrp="1"/>
-          </p:cNvSpPr>
-          <p:nvPr>
-            <p:ph idx="1"/>
-          </p:nvPr>
-        </p:nvSpPr>
-        <p:spPr/>
-        <p:txBody>
-          <a:bodyPr/>
-          <a:lstStyle/>
-          <a:p>
-            <a:r>
-              <a:rPr lang="en-US" dirty="0" smtClean="0"/>
-              <a:t>RNA-</a:t>
-            </a:r>
-            <a:r>
-              <a:rPr lang="en-US" dirty="0" err="1" smtClean="0"/>
-              <a:t>seq</a:t>
-            </a:r>
-            <a:r>
-              <a:rPr lang="en-US" dirty="0" smtClean="0"/>
-              <a:t> data&gt; bioinformatics analysis.</a:t>
-            </a:r>
-          </a:p>
-          <a:p>
-            <a:r>
-              <a:rPr lang="en-US" dirty="0" smtClean="0"/>
-              <a:t>RT-qPCR validation.</a:t>
-            </a:r>
-          </a:p>
-          <a:p>
+              <a:t>Slide on PC3 cells </a:t>
+            </a:r>
             <a:endParaRPr lang="en-AU" dirty="0"/>
           </a:p>
         </p:txBody>
@@ -3267,13 +3335,20 @@
     </p:spTree>
     <p:extLst>
       <p:ext uri="{BB962C8B-B14F-4D97-AF65-F5344CB8AC3E}">
-        <p14:creationId xmlns:p14="http://schemas.microsoft.com/office/powerpoint/2010/main" val="1589515835"/>
+        <p14:creationId xmlns:p14="http://schemas.microsoft.com/office/powerpoint/2010/main" val="4112382453"/>
       </p:ext>
     </p:extLst>
   </p:cSld>
   <p:clrMapOvr>
     <a:masterClrMapping/>
   </p:clrMapOvr>
+  <p:timing>
+    <p:tnLst>
+      <p:par>
+        <p:cTn id="1" dur="indefinite" restart="never" nodeType="tmRoot"/>
+      </p:par>
+    </p:tnLst>
+  </p:timing>
 </p:sld>
 </file>
 
@@ -3309,6 +3384,10 @@
           <a:bodyPr/>
           <a:lstStyle/>
           <a:p>
+            <a:r>
+              <a:rPr lang="en-US" dirty="0" smtClean="0"/>
+              <a:t>Methods- Aim1.</a:t>
+            </a:r>
             <a:endParaRPr lang="en-AU" dirty="0"/>
           </a:p>
         </p:txBody>
@@ -3330,16 +3409,24 @@
           <a:p>
             <a:r>
               <a:rPr lang="en-US" dirty="0" smtClean="0"/>
-              <a:t>Explain the </a:t>
+              <a:t>RNA-</a:t>
             </a:r>
             <a:r>
               <a:rPr lang="en-US" dirty="0" err="1" smtClean="0"/>
-              <a:t>comparasions</a:t>
+              <a:t>seq</a:t>
             </a:r>
             <a:r>
               <a:rPr lang="en-US" dirty="0" smtClean="0"/>
-              <a:t> that will be made. </a:t>
-            </a:r>
+              <a:t> data&gt; bioinformatics analysis.</a:t>
+            </a:r>
+          </a:p>
+          <a:p>
+            <a:r>
+              <a:rPr lang="en-US" dirty="0" smtClean="0"/>
+              <a:t>RT-qPCR validation.</a:t>
+            </a:r>
+          </a:p>
+          <a:p>
             <a:endParaRPr lang="en-AU" dirty="0"/>
           </a:p>
         </p:txBody>
@@ -3347,13 +3434,20 @@
     </p:spTree>
     <p:extLst>
       <p:ext uri="{BB962C8B-B14F-4D97-AF65-F5344CB8AC3E}">
-        <p14:creationId xmlns:p14="http://schemas.microsoft.com/office/powerpoint/2010/main" val="337355244"/>
+        <p14:creationId xmlns:p14="http://schemas.microsoft.com/office/powerpoint/2010/main" val="1589515835"/>
       </p:ext>
     </p:extLst>
   </p:cSld>
   <p:clrMapOvr>
     <a:masterClrMapping/>
   </p:clrMapOvr>
+  <p:timing>
+    <p:tnLst>
+      <p:par>
+        <p:cTn id="1" dur="indefinite" restart="never" nodeType="tmRoot"/>
+      </p:par>
+    </p:tnLst>
+  </p:timing>
 </p:sld>
 </file>
 
@@ -3389,44 +3483,36 @@
           <a:bodyPr/>
           <a:lstStyle/>
           <a:p>
+            <a:endParaRPr lang="en-AU" dirty="0"/>
+          </a:p>
+        </p:txBody>
+      </p:sp>
+      <p:sp>
+        <p:nvSpPr>
+          <p:cNvPr id="3" name="Content Placeholder 2"/>
+          <p:cNvSpPr>
+            <a:spLocks noGrp="1"/>
+          </p:cNvSpPr>
+          <p:nvPr>
+            <p:ph idx="1"/>
+          </p:nvPr>
+        </p:nvSpPr>
+        <p:spPr/>
+        <p:txBody>
+          <a:bodyPr/>
+          <a:lstStyle/>
+          <a:p>
             <a:r>
               <a:rPr lang="en-US" dirty="0" smtClean="0"/>
-              <a:t>Method – Aim 2. </a:t>
-            </a:r>
-            <a:endParaRPr lang="en-AU" dirty="0"/>
-          </a:p>
-        </p:txBody>
-      </p:sp>
-      <p:sp>
-        <p:nvSpPr>
-          <p:cNvPr id="3" name="Content Placeholder 2"/>
-          <p:cNvSpPr>
-            <a:spLocks noGrp="1"/>
-          </p:cNvSpPr>
-          <p:nvPr>
-            <p:ph idx="1"/>
-          </p:nvPr>
-        </p:nvSpPr>
-        <p:spPr/>
-        <p:txBody>
-          <a:bodyPr/>
-          <a:lstStyle/>
-          <a:p>
+              <a:t>Explain the </a:t>
+            </a:r>
+            <a:r>
+              <a:rPr lang="en-US" dirty="0" err="1" smtClean="0"/>
+              <a:t>comparasions</a:t>
+            </a:r>
             <a:r>
               <a:rPr lang="en-US" dirty="0" smtClean="0"/>
-              <a:t>Identify targets through bioinformatics. </a:t>
-            </a:r>
-          </a:p>
-          <a:p>
-            <a:r>
-              <a:rPr lang="en-US" dirty="0" smtClean="0"/>
-              <a:t>Verify targets through subcellular proteomics.</a:t>
-            </a:r>
-          </a:p>
-          <a:p>
-            <a:r>
-              <a:rPr lang="en-US" dirty="0" smtClean="0"/>
-              <a:t>Finds potential interaction partners. </a:t>
+              <a:t> that will be made. </a:t>
             </a:r>
             <a:endParaRPr lang="en-AU" dirty="0"/>
           </a:p>
@@ -3435,13 +3521,20 @@
     </p:spTree>
     <p:extLst>
       <p:ext uri="{BB962C8B-B14F-4D97-AF65-F5344CB8AC3E}">
-        <p14:creationId xmlns:p14="http://schemas.microsoft.com/office/powerpoint/2010/main" val="2718663117"/>
+        <p14:creationId xmlns:p14="http://schemas.microsoft.com/office/powerpoint/2010/main" val="337355244"/>
       </p:ext>
     </p:extLst>
   </p:cSld>
   <p:clrMapOvr>
     <a:masterClrMapping/>
   </p:clrMapOvr>
+  <p:timing>
+    <p:tnLst>
+      <p:par>
+        <p:cTn id="1" dur="indefinite" restart="never" nodeType="tmRoot"/>
+      </p:par>
+    </p:tnLst>
+  </p:timing>
 </p:sld>
 </file>
 
@@ -3479,7 +3572,7 @@
           <a:p>
             <a:r>
               <a:rPr lang="en-US" dirty="0" smtClean="0"/>
-              <a:t>Expected or logic behind the aim?</a:t>
+              <a:t>Method – Aim 2. </a:t>
             </a:r>
             <a:endParaRPr lang="en-AU" dirty="0"/>
           </a:p>
@@ -3500,20 +3593,43 @@
           <a:bodyPr/>
           <a:lstStyle/>
           <a:p>
-            <a:endParaRPr lang="en-AU"/>
+            <a:r>
+              <a:rPr lang="en-US" dirty="0" smtClean="0"/>
+              <a:t>Identify targets through bioinformatics. </a:t>
+            </a:r>
+          </a:p>
+          <a:p>
+            <a:r>
+              <a:rPr lang="en-US" dirty="0" smtClean="0"/>
+              <a:t>Verify targets through subcellular proteomics.</a:t>
+            </a:r>
+          </a:p>
+          <a:p>
+            <a:r>
+              <a:rPr lang="en-US" dirty="0" smtClean="0"/>
+              <a:t>Finds potential interaction partners. </a:t>
+            </a:r>
+            <a:endParaRPr lang="en-AU" dirty="0"/>
           </a:p>
         </p:txBody>
       </p:sp>
     </p:spTree>
     <p:extLst>
       <p:ext uri="{BB962C8B-B14F-4D97-AF65-F5344CB8AC3E}">
-        <p14:creationId xmlns:p14="http://schemas.microsoft.com/office/powerpoint/2010/main" val="1506494679"/>
+        <p14:creationId xmlns:p14="http://schemas.microsoft.com/office/powerpoint/2010/main" val="2718663117"/>
       </p:ext>
     </p:extLst>
   </p:cSld>
   <p:clrMapOvr>
     <a:masterClrMapping/>
   </p:clrMapOvr>
+  <p:timing>
+    <p:tnLst>
+      <p:par>
+        <p:cTn id="1" dur="indefinite" restart="never" nodeType="tmRoot"/>
+      </p:par>
+    </p:tnLst>
+  </p:timing>
 </p:sld>
 </file>
 
@@ -3551,7 +3667,7 @@
           <a:p>
             <a:r>
               <a:rPr lang="en-US" dirty="0" smtClean="0"/>
-              <a:t>Methods- aim 3</a:t>
+              <a:t>Expected or logic behind the aim?</a:t>
             </a:r>
             <a:endParaRPr lang="en-AU" dirty="0"/>
           </a:p>
@@ -3572,38 +3688,27 @@
           <a:bodyPr/>
           <a:lstStyle/>
           <a:p>
-            <a:r>
-              <a:rPr lang="en-US" dirty="0" smtClean="0"/>
-              <a:t>Functional assessment of potential interaction partners/ ECSRT protein. </a:t>
-            </a:r>
-          </a:p>
-          <a:p>
-            <a:r>
-              <a:rPr lang="en-US" dirty="0" smtClean="0"/>
-              <a:t>Indirect </a:t>
-            </a:r>
-            <a:r>
-              <a:rPr lang="en-US" dirty="0" err="1" smtClean="0"/>
-              <a:t>Immunofluroescence</a:t>
-            </a:r>
-            <a:r>
-              <a:rPr lang="en-US" dirty="0" smtClean="0"/>
-              <a:t>, miRNA in-situ hybridization. </a:t>
-            </a:r>
-            <a:endParaRPr lang="en-AU" dirty="0"/>
+            <a:endParaRPr lang="en-AU"/>
           </a:p>
         </p:txBody>
       </p:sp>
     </p:spTree>
     <p:extLst>
       <p:ext uri="{BB962C8B-B14F-4D97-AF65-F5344CB8AC3E}">
-        <p14:creationId xmlns:p14="http://schemas.microsoft.com/office/powerpoint/2010/main" val="2350575895"/>
+        <p14:creationId xmlns:p14="http://schemas.microsoft.com/office/powerpoint/2010/main" val="1506494679"/>
       </p:ext>
     </p:extLst>
   </p:cSld>
   <p:clrMapOvr>
     <a:masterClrMapping/>
   </p:clrMapOvr>
+  <p:timing>
+    <p:tnLst>
+      <p:par>
+        <p:cTn id="1" dur="indefinite" restart="never" nodeType="tmRoot"/>
+      </p:par>
+    </p:tnLst>
+  </p:timing>
 </p:sld>
 </file>
 
@@ -3640,46 +3745,67 @@
           <a:lstStyle/>
           <a:p>
             <a:r>
+              <a:rPr lang="en-US" dirty="0" smtClean="0"/>
+              <a:t>Methods- aim 3</a:t>
+            </a:r>
+            <a:endParaRPr lang="en-AU" dirty="0"/>
+          </a:p>
+        </p:txBody>
+      </p:sp>
+      <p:sp>
+        <p:nvSpPr>
+          <p:cNvPr id="3" name="Content Placeholder 2"/>
+          <p:cNvSpPr>
+            <a:spLocks noGrp="1"/>
+          </p:cNvSpPr>
+          <p:nvPr>
+            <p:ph idx="1"/>
+          </p:nvPr>
+        </p:nvSpPr>
+        <p:spPr/>
+        <p:txBody>
+          <a:bodyPr/>
+          <a:lstStyle/>
+          <a:p>
+            <a:r>
+              <a:rPr lang="en-US" dirty="0" smtClean="0"/>
+              <a:t>Functional assessment of potential interaction partners/ ECSRT protein. </a:t>
+            </a:r>
+          </a:p>
+          <a:p>
+            <a:r>
+              <a:rPr lang="en-US" dirty="0" smtClean="0"/>
+              <a:t>Indirect </a:t>
+            </a:r>
+            <a:r>
               <a:rPr lang="en-US" dirty="0" err="1" smtClean="0"/>
-              <a:t>CoIP</a:t>
+              <a:t>Immunofluroescence</a:t>
             </a:r>
             <a:r>
               <a:rPr lang="en-US" dirty="0" smtClean="0"/>
-              <a:t> method</a:t>
+              <a:t>, miRNA in-situ hybridization. </a:t>
             </a:r>
             <a:endParaRPr lang="en-AU" dirty="0"/>
-          </a:p>
-        </p:txBody>
-      </p:sp>
-      <p:sp>
-        <p:nvSpPr>
-          <p:cNvPr id="3" name="Content Placeholder 2"/>
-          <p:cNvSpPr>
-            <a:spLocks noGrp="1"/>
-          </p:cNvSpPr>
-          <p:nvPr>
-            <p:ph idx="1"/>
-          </p:nvPr>
-        </p:nvSpPr>
-        <p:spPr/>
-        <p:txBody>
-          <a:bodyPr/>
-          <a:lstStyle/>
-          <a:p>
-            <a:endParaRPr lang="en-AU"/>
           </a:p>
         </p:txBody>
       </p:sp>
     </p:spTree>
     <p:extLst>
       <p:ext uri="{BB962C8B-B14F-4D97-AF65-F5344CB8AC3E}">
-        <p14:creationId xmlns:p14="http://schemas.microsoft.com/office/powerpoint/2010/main" val="1016718847"/>
+        <p14:creationId xmlns:p14="http://schemas.microsoft.com/office/powerpoint/2010/main" val="2350575895"/>
       </p:ext>
     </p:extLst>
   </p:cSld>
   <p:clrMapOvr>
     <a:masterClrMapping/>
   </p:clrMapOvr>
+  <p:timing>
+    <p:tnLst>
+      <p:par>
+        <p:cTn id="1" dur="indefinite" restart="never" nodeType="tmRoot"/>
+      </p:par>
+    </p:tnLst>
+  </p:timing>
 </p:sld>
 </file>
 
@@ -3716,8 +3842,12 @@
           <a:lstStyle/>
           <a:p>
             <a:r>
+              <a:rPr lang="en-US" dirty="0" err="1" smtClean="0"/>
+              <a:t>CoIP</a:t>
+            </a:r>
+            <a:r>
               <a:rPr lang="en-US" dirty="0" smtClean="0"/>
-              <a:t>Significance</a:t>
+              <a:t> method</a:t>
             </a:r>
             <a:endParaRPr lang="en-AU" dirty="0"/>
           </a:p>
@@ -3738,24 +3868,27 @@
           <a:bodyPr/>
           <a:lstStyle/>
           <a:p>
-            <a:r>
-              <a:rPr lang="en-US" dirty="0" smtClean="0"/>
-              <a:t>Mostly discuss what the results will do for future. </a:t>
-            </a:r>
-            <a:endParaRPr lang="en-AU" dirty="0"/>
+            <a:endParaRPr lang="en-AU"/>
           </a:p>
         </p:txBody>
       </p:sp>
     </p:spTree>
     <p:extLst>
       <p:ext uri="{BB962C8B-B14F-4D97-AF65-F5344CB8AC3E}">
-        <p14:creationId xmlns:p14="http://schemas.microsoft.com/office/powerpoint/2010/main" val="4034627545"/>
+        <p14:creationId xmlns:p14="http://schemas.microsoft.com/office/powerpoint/2010/main" val="1016718847"/>
       </p:ext>
     </p:extLst>
   </p:cSld>
   <p:clrMapOvr>
     <a:masterClrMapping/>
   </p:clrMapOvr>
+  <p:timing>
+    <p:tnLst>
+      <p:par>
+        <p:cTn id="1" dur="indefinite" restart="never" nodeType="tmRoot"/>
+      </p:par>
+    </p:tnLst>
+  </p:timing>
 </p:sld>
 </file>
 
@@ -3793,7 +3926,7 @@
           <a:p>
             <a:r>
               <a:rPr lang="en-US" dirty="0" smtClean="0"/>
-              <a:t>Acknowledgements</a:t>
+              <a:t>Significance</a:t>
             </a:r>
             <a:endParaRPr lang="en-AU" dirty="0"/>
           </a:p>
@@ -3814,6 +3947,10 @@
           <a:bodyPr/>
           <a:lstStyle/>
           <a:p>
+            <a:r>
+              <a:rPr lang="en-US" dirty="0" smtClean="0"/>
+              <a:t>Mostly discuss what the results will do for future. </a:t>
+            </a:r>
             <a:endParaRPr lang="en-AU" dirty="0"/>
           </a:p>
         </p:txBody>
@@ -3821,13 +3958,20 @@
     </p:spTree>
     <p:extLst>
       <p:ext uri="{BB962C8B-B14F-4D97-AF65-F5344CB8AC3E}">
-        <p14:creationId xmlns:p14="http://schemas.microsoft.com/office/powerpoint/2010/main" val="4050970755"/>
+        <p14:creationId xmlns:p14="http://schemas.microsoft.com/office/powerpoint/2010/main" val="4034627545"/>
       </p:ext>
     </p:extLst>
   </p:cSld>
   <p:clrMapOvr>
     <a:masterClrMapping/>
   </p:clrMapOvr>
+  <p:timing>
+    <p:tnLst>
+      <p:par>
+        <p:cTn id="1" dur="indefinite" restart="never" nodeType="tmRoot"/>
+      </p:par>
+    </p:tnLst>
+  </p:timing>
 </p:sld>
 </file>
 
@@ -3858,35 +4002,49 @@
             <p:ph type="title"/>
           </p:nvPr>
         </p:nvSpPr>
-        <p:spPr/>
-        <p:txBody>
-          <a:bodyPr/>
-          <a:lstStyle/>
-          <a:p>
-            <a:r>
-              <a:rPr lang="en-US" dirty="0" smtClean="0"/>
-              <a:t>Background to the disease of interest: prostate cancer. </a:t>
-            </a:r>
+        <p:spPr>
+          <a:xfrm>
+            <a:off x="838200" y="218168"/>
+            <a:ext cx="10515600" cy="1325563"/>
+          </a:xfrm>
+        </p:spPr>
+        <p:txBody>
+          <a:bodyPr/>
+          <a:lstStyle/>
+          <a:p>
+            <a:r>
+              <a:rPr lang="en-US" b="1" dirty="0"/>
+              <a:t>P</a:t>
+            </a:r>
+            <a:r>
+              <a:rPr lang="en-US" b="1" dirty="0" smtClean="0"/>
+              <a:t>rostate cancer </a:t>
+            </a:r>
+            <a:endParaRPr lang="en-AU" b="1" dirty="0"/>
+          </a:p>
+        </p:txBody>
+      </p:sp>
+      <p:sp>
+        <p:nvSpPr>
+          <p:cNvPr id="7" name="Content Placeholder 6"/>
+          <p:cNvSpPr>
+            <a:spLocks noGrp="1"/>
+          </p:cNvSpPr>
+          <p:nvPr>
+            <p:ph idx="1"/>
+          </p:nvPr>
+        </p:nvSpPr>
+        <p:spPr>
+          <a:xfrm>
+            <a:off x="838200" y="1543731"/>
+            <a:ext cx="10515600" cy="4351338"/>
+          </a:xfrm>
+        </p:spPr>
+        <p:txBody>
+          <a:bodyPr/>
+          <a:lstStyle/>
+          <a:p>
             <a:endParaRPr lang="en-AU" dirty="0"/>
-          </a:p>
-        </p:txBody>
-      </p:sp>
-      <p:sp>
-        <p:nvSpPr>
-          <p:cNvPr id="3" name="Content Placeholder 2"/>
-          <p:cNvSpPr>
-            <a:spLocks noGrp="1"/>
-          </p:cNvSpPr>
-          <p:nvPr>
-            <p:ph idx="1"/>
-          </p:nvPr>
-        </p:nvSpPr>
-        <p:spPr/>
-        <p:txBody>
-          <a:bodyPr/>
-          <a:lstStyle/>
-          <a:p>
-            <a:endParaRPr lang="en-AU"/>
           </a:p>
         </p:txBody>
       </p:sp>
@@ -3900,6 +4058,92 @@
   <p:clrMapOvr>
     <a:masterClrMapping/>
   </p:clrMapOvr>
+  <p:timing>
+    <p:tnLst>
+      <p:par>
+        <p:cTn id="1" dur="indefinite" restart="never" nodeType="tmRoot"/>
+      </p:par>
+    </p:tnLst>
+  </p:timing>
+</p:sld>
+</file>
+
+<file path=ppt/slides/slide20.xml><?xml version="1.0" encoding="utf-8"?>
+<p:sld xmlns:a="http://schemas.openxmlformats.org/drawingml/2006/main" xmlns:r="http://schemas.openxmlformats.org/officeDocument/2006/relationships" xmlns:p="http://schemas.openxmlformats.org/presentationml/2006/main">
+  <p:cSld>
+    <p:spTree>
+      <p:nvGrpSpPr>
+        <p:cNvPr id="1" name=""/>
+        <p:cNvGrpSpPr/>
+        <p:nvPr/>
+      </p:nvGrpSpPr>
+      <p:grpSpPr>
+        <a:xfrm>
+          <a:off x="0" y="0"/>
+          <a:ext cx="0" cy="0"/>
+          <a:chOff x="0" y="0"/>
+          <a:chExt cx="0" cy="0"/>
+        </a:xfrm>
+      </p:grpSpPr>
+      <p:sp>
+        <p:nvSpPr>
+          <p:cNvPr id="2" name="Title 1"/>
+          <p:cNvSpPr>
+            <a:spLocks noGrp="1"/>
+          </p:cNvSpPr>
+          <p:nvPr>
+            <p:ph type="title"/>
+          </p:nvPr>
+        </p:nvSpPr>
+        <p:spPr/>
+        <p:txBody>
+          <a:bodyPr/>
+          <a:lstStyle/>
+          <a:p>
+            <a:r>
+              <a:rPr lang="en-US" dirty="0" smtClean="0"/>
+              <a:t>Acknowledgements</a:t>
+            </a:r>
+            <a:endParaRPr lang="en-AU" dirty="0"/>
+          </a:p>
+        </p:txBody>
+      </p:sp>
+      <p:sp>
+        <p:nvSpPr>
+          <p:cNvPr id="3" name="Content Placeholder 2"/>
+          <p:cNvSpPr>
+            <a:spLocks noGrp="1"/>
+          </p:cNvSpPr>
+          <p:nvPr>
+            <p:ph idx="1"/>
+          </p:nvPr>
+        </p:nvSpPr>
+        <p:spPr/>
+        <p:txBody>
+          <a:bodyPr/>
+          <a:lstStyle/>
+          <a:p>
+            <a:endParaRPr lang="en-AU" dirty="0"/>
+          </a:p>
+        </p:txBody>
+      </p:sp>
+    </p:spTree>
+    <p:extLst>
+      <p:ext uri="{BB962C8B-B14F-4D97-AF65-F5344CB8AC3E}">
+        <p14:creationId xmlns:p14="http://schemas.microsoft.com/office/powerpoint/2010/main" val="4050970755"/>
+      </p:ext>
+    </p:extLst>
+  </p:cSld>
+  <p:clrMapOvr>
+    <a:masterClrMapping/>
+  </p:clrMapOvr>
+  <p:timing>
+    <p:tnLst>
+      <p:par>
+        <p:cTn id="1" dur="indefinite" restart="never" nodeType="tmRoot"/>
+      </p:par>
+    </p:tnLst>
+  </p:timing>
 </p:sld>
 </file>
 
@@ -3935,61 +4179,81 @@
           <a:bodyPr/>
           <a:lstStyle/>
           <a:p>
-            <a:r>
-              <a:rPr lang="en-US" dirty="0" err="1" smtClean="0"/>
-              <a:t>Caveolae</a:t>
-            </a:r>
-            <a:r>
-              <a:rPr lang="en-US" dirty="0" smtClean="0"/>
-              <a:t>, </a:t>
-            </a:r>
-            <a:r>
-              <a:rPr lang="en-US" dirty="0" err="1" smtClean="0"/>
-              <a:t>Caveolins</a:t>
-            </a:r>
-            <a:r>
-              <a:rPr lang="en-US" dirty="0" smtClean="0"/>
-              <a:t> and </a:t>
-            </a:r>
-            <a:r>
-              <a:rPr lang="en-US" dirty="0" err="1" smtClean="0"/>
-              <a:t>Cavins</a:t>
-            </a:r>
-            <a:r>
-              <a:rPr lang="en-US" dirty="0" smtClean="0"/>
-              <a:t>. </a:t>
-            </a:r>
+            <a:endParaRPr lang="en-AU"/>
+          </a:p>
+        </p:txBody>
+      </p:sp>
+      <p:sp>
+        <p:nvSpPr>
+          <p:cNvPr id="3" name="Content Placeholder 2"/>
+          <p:cNvSpPr>
+            <a:spLocks noGrp="1"/>
+          </p:cNvSpPr>
+          <p:nvPr>
+            <p:ph idx="1"/>
+          </p:nvPr>
+        </p:nvSpPr>
+        <p:spPr/>
+        <p:txBody>
+          <a:bodyPr/>
+          <a:lstStyle/>
+          <a:p>
             <a:endParaRPr lang="en-AU" dirty="0"/>
           </a:p>
         </p:txBody>
       </p:sp>
-      <p:sp>
-        <p:nvSpPr>
-          <p:cNvPr id="3" name="Content Placeholder 2"/>
-          <p:cNvSpPr>
-            <a:spLocks noGrp="1"/>
-          </p:cNvSpPr>
-          <p:nvPr>
-            <p:ph idx="1"/>
-          </p:nvPr>
-        </p:nvSpPr>
-        <p:spPr/>
-        <p:txBody>
-          <a:bodyPr/>
-          <a:lstStyle/>
-          <a:p>
-            <a:r>
-              <a:rPr lang="en-US" dirty="0" smtClean="0"/>
-              <a:t>Introduce this system</a:t>
-            </a:r>
-            <a:endParaRPr lang="en-AU" dirty="0"/>
-          </a:p>
-        </p:txBody>
-      </p:sp>
+      <p:pic>
+        <p:nvPicPr>
+          <p:cNvPr id="4" name="Content Placeholder 3"/>
+          <p:cNvPicPr>
+            <a:picLocks noChangeAspect="1"/>
+          </p:cNvPicPr>
+          <p:nvPr/>
+        </p:nvPicPr>
+        <p:blipFill>
+          <a:blip r:embed="rId2"/>
+          <a:stretch>
+            <a:fillRect/>
+          </a:stretch>
+        </p:blipFill>
+        <p:spPr>
+          <a:xfrm>
+            <a:off x="5638800" y="542246"/>
+            <a:ext cx="5715000" cy="2857500"/>
+          </a:xfrm>
+          <a:prstGeom prst="rect">
+            <a:avLst/>
+          </a:prstGeom>
+        </p:spPr>
+      </p:pic>
+      <p:pic>
+        <p:nvPicPr>
+          <p:cNvPr id="5" name="Picture 4"/>
+          <p:cNvPicPr>
+            <a:picLocks noChangeAspect="1"/>
+          </p:cNvPicPr>
+          <p:nvPr/>
+        </p:nvPicPr>
+        <p:blipFill>
+          <a:blip r:embed="rId3"/>
+          <a:stretch>
+            <a:fillRect/>
+          </a:stretch>
+        </p:blipFill>
+        <p:spPr>
+          <a:xfrm>
+            <a:off x="5802086" y="3579360"/>
+            <a:ext cx="5715000" cy="2857500"/>
+          </a:xfrm>
+          <a:prstGeom prst="rect">
+            <a:avLst/>
+          </a:prstGeom>
+        </p:spPr>
+      </p:pic>
     </p:spTree>
     <p:extLst>
       <p:ext uri="{BB962C8B-B14F-4D97-AF65-F5344CB8AC3E}">
-        <p14:creationId xmlns:p14="http://schemas.microsoft.com/office/powerpoint/2010/main" val="4268105612"/>
+        <p14:creationId xmlns:p14="http://schemas.microsoft.com/office/powerpoint/2010/main" val="1912633840"/>
       </p:ext>
     </p:extLst>
   </p:cSld>
@@ -4033,8 +4297,28 @@
           <a:p>
             <a:r>
               <a:rPr lang="en-US" dirty="0" err="1" smtClean="0"/>
+              <a:t>Caveolae</a:t>
+            </a:r>
+            <a:r>
+              <a:rPr lang="en-US" dirty="0" smtClean="0"/>
+              <a:t>, </a:t>
+            </a:r>
+            <a:r>
+              <a:rPr lang="en-US" dirty="0" err="1" smtClean="0"/>
               <a:t>Caveolins</a:t>
             </a:r>
+            <a:r>
+              <a:rPr lang="en-US" dirty="0" smtClean="0"/>
+              <a:t> and </a:t>
+            </a:r>
+            <a:r>
+              <a:rPr lang="en-US" dirty="0" err="1" smtClean="0"/>
+              <a:t>Cavins</a:t>
+            </a:r>
+            <a:r>
+              <a:rPr lang="en-US" dirty="0" smtClean="0"/>
+              <a:t>. </a:t>
+            </a:r>
             <a:endParaRPr lang="en-AU" dirty="0"/>
           </a:p>
         </p:txBody>
@@ -4054,20 +4338,31 @@
           <a:bodyPr/>
           <a:lstStyle/>
           <a:p>
-            <a:endParaRPr lang="en-AU"/>
+            <a:r>
+              <a:rPr lang="en-US" dirty="0" smtClean="0"/>
+              <a:t>Introduce this system</a:t>
+            </a:r>
+            <a:endParaRPr lang="en-AU" dirty="0"/>
           </a:p>
         </p:txBody>
       </p:sp>
     </p:spTree>
     <p:extLst>
       <p:ext uri="{BB962C8B-B14F-4D97-AF65-F5344CB8AC3E}">
-        <p14:creationId xmlns:p14="http://schemas.microsoft.com/office/powerpoint/2010/main" val="851287208"/>
+        <p14:creationId xmlns:p14="http://schemas.microsoft.com/office/powerpoint/2010/main" val="4268105612"/>
       </p:ext>
     </p:extLst>
   </p:cSld>
   <p:clrMapOvr>
     <a:masterClrMapping/>
   </p:clrMapOvr>
+  <p:timing>
+    <p:tnLst>
+      <p:par>
+        <p:cTn id="1" dur="indefinite" restart="never" nodeType="tmRoot"/>
+      </p:par>
+    </p:tnLst>
+  </p:timing>
 </p:sld>
 </file>
 
@@ -4105,7 +4400,7 @@
           <a:p>
             <a:r>
               <a:rPr lang="en-US" dirty="0" err="1" smtClean="0"/>
-              <a:t>Cavins</a:t>
+              <a:t>Caveolins</a:t>
             </a:r>
             <a:endParaRPr lang="en-AU" dirty="0"/>
           </a:p>
@@ -4133,13 +4428,20 @@
     </p:spTree>
     <p:extLst>
       <p:ext uri="{BB962C8B-B14F-4D97-AF65-F5344CB8AC3E}">
-        <p14:creationId xmlns:p14="http://schemas.microsoft.com/office/powerpoint/2010/main" val="2804912544"/>
+        <p14:creationId xmlns:p14="http://schemas.microsoft.com/office/powerpoint/2010/main" val="851287208"/>
       </p:ext>
     </p:extLst>
   </p:cSld>
   <p:clrMapOvr>
     <a:masterClrMapping/>
   </p:clrMapOvr>
+  <p:timing>
+    <p:tnLst>
+      <p:par>
+        <p:cTn id="1" dur="indefinite" restart="never" nodeType="tmRoot"/>
+      </p:par>
+    </p:tnLst>
+  </p:timing>
 </p:sld>
 </file>
 
@@ -4176,8 +4478,8 @@
           <a:lstStyle/>
           <a:p>
             <a:r>
-              <a:rPr lang="en-US" dirty="0" smtClean="0"/>
-              <a:t>Exosomes/ECVs in cancer</a:t>
+              <a:rPr lang="en-US" dirty="0" err="1" smtClean="0"/>
+              <a:t>Cavins</a:t>
             </a:r>
             <a:endParaRPr lang="en-AU" dirty="0"/>
           </a:p>
@@ -4198,20 +4500,27 @@
           <a:bodyPr/>
           <a:lstStyle/>
           <a:p>
-            <a:endParaRPr lang="en-AU" dirty="0"/>
+            <a:endParaRPr lang="en-AU"/>
           </a:p>
         </p:txBody>
       </p:sp>
     </p:spTree>
     <p:extLst>
       <p:ext uri="{BB962C8B-B14F-4D97-AF65-F5344CB8AC3E}">
-        <p14:creationId xmlns:p14="http://schemas.microsoft.com/office/powerpoint/2010/main" val="238393214"/>
+        <p14:creationId xmlns:p14="http://schemas.microsoft.com/office/powerpoint/2010/main" val="2804912544"/>
       </p:ext>
     </p:extLst>
   </p:cSld>
   <p:clrMapOvr>
     <a:masterClrMapping/>
   </p:clrMapOvr>
+  <p:timing>
+    <p:tnLst>
+      <p:par>
+        <p:cTn id="1" dur="indefinite" restart="never" nodeType="tmRoot"/>
+      </p:par>
+    </p:tnLst>
+  </p:timing>
 </p:sld>
 </file>
 
@@ -4248,20 +4557,8 @@
           <a:lstStyle/>
           <a:p>
             <a:r>
-              <a:rPr lang="en-US" dirty="0" err="1" smtClean="0"/>
-              <a:t>Cavins</a:t>
-            </a:r>
-            <a:r>
               <a:rPr lang="en-US" dirty="0" smtClean="0"/>
-              <a:t> mediating the </a:t>
-            </a:r>
-            <a:r>
-              <a:rPr lang="en-US" dirty="0" err="1" smtClean="0"/>
-              <a:t>exosomal</a:t>
-            </a:r>
-            <a:r>
-              <a:rPr lang="en-US" dirty="0" smtClean="0"/>
-              <a:t> export </a:t>
+              <a:t>Exosomes/ECVs in cancer</a:t>
             </a:r>
             <a:endParaRPr lang="en-AU" dirty="0"/>
           </a:p>
@@ -4282,20 +4579,27 @@
           <a:bodyPr/>
           <a:lstStyle/>
           <a:p>
-            <a:endParaRPr lang="en-AU"/>
+            <a:endParaRPr lang="en-AU" dirty="0"/>
           </a:p>
         </p:txBody>
       </p:sp>
     </p:spTree>
     <p:extLst>
       <p:ext uri="{BB962C8B-B14F-4D97-AF65-F5344CB8AC3E}">
-        <p14:creationId xmlns:p14="http://schemas.microsoft.com/office/powerpoint/2010/main" val="2646513302"/>
+        <p14:creationId xmlns:p14="http://schemas.microsoft.com/office/powerpoint/2010/main" val="238393214"/>
       </p:ext>
     </p:extLst>
   </p:cSld>
   <p:clrMapOvr>
     <a:masterClrMapping/>
   </p:clrMapOvr>
+  <p:timing>
+    <p:tnLst>
+      <p:par>
+        <p:cTn id="1" dur="indefinite" restart="never" nodeType="tmRoot"/>
+      </p:par>
+    </p:tnLst>
+  </p:timing>
 </p:sld>
 </file>
 
@@ -4332,8 +4636,20 @@
           <a:lstStyle/>
           <a:p>
             <a:r>
+              <a:rPr lang="en-US" dirty="0" err="1" smtClean="0"/>
+              <a:t>Cavins</a:t>
+            </a:r>
+            <a:r>
               <a:rPr lang="en-US" dirty="0" smtClean="0"/>
-              <a:t>microRNAs in cancer. ?? Maybe or include this info on the last slide,</a:t>
+              <a:t> mediating the </a:t>
+            </a:r>
+            <a:r>
+              <a:rPr lang="en-US" dirty="0" err="1" smtClean="0"/>
+              <a:t>exosomal</a:t>
+            </a:r>
+            <a:r>
+              <a:rPr lang="en-US" dirty="0" smtClean="0"/>
+              <a:t> export </a:t>
             </a:r>
             <a:endParaRPr lang="en-AU" dirty="0"/>
           </a:p>
@@ -4361,13 +4677,20 @@
     </p:spTree>
     <p:extLst>
       <p:ext uri="{BB962C8B-B14F-4D97-AF65-F5344CB8AC3E}">
-        <p14:creationId xmlns:p14="http://schemas.microsoft.com/office/powerpoint/2010/main" val="710753060"/>
+        <p14:creationId xmlns:p14="http://schemas.microsoft.com/office/powerpoint/2010/main" val="2646513302"/>
       </p:ext>
     </p:extLst>
   </p:cSld>
   <p:clrMapOvr>
     <a:masterClrMapping/>
   </p:clrMapOvr>
+  <p:timing>
+    <p:tnLst>
+      <p:par>
+        <p:cTn id="1" dur="indefinite" restart="never" nodeType="tmRoot"/>
+      </p:par>
+    </p:tnLst>
+  </p:timing>
 </p:sld>
 </file>
 
@@ -4405,7 +4728,7 @@
           <a:p>
             <a:r>
               <a:rPr lang="en-US" dirty="0" smtClean="0"/>
-              <a:t>Hypothesis</a:t>
+              <a:t>microRNAs in cancer. ?? Maybe or include this info on the last slide,</a:t>
             </a:r>
             <a:endParaRPr lang="en-AU" dirty="0"/>
           </a:p>
@@ -4433,20 +4756,27 @@
     </p:spTree>
     <p:extLst>
       <p:ext uri="{BB962C8B-B14F-4D97-AF65-F5344CB8AC3E}">
-        <p14:creationId xmlns:p14="http://schemas.microsoft.com/office/powerpoint/2010/main" val="1151147403"/>
+        <p14:creationId xmlns:p14="http://schemas.microsoft.com/office/powerpoint/2010/main" val="710753060"/>
       </p:ext>
     </p:extLst>
   </p:cSld>
   <p:clrMapOvr>
     <a:masterClrMapping/>
   </p:clrMapOvr>
+  <p:timing>
+    <p:tnLst>
+      <p:par>
+        <p:cTn id="1" dur="indefinite" restart="never" nodeType="tmRoot"/>
+      </p:par>
+    </p:tnLst>
+  </p:timing>
 </p:sld>
 </file>
 
 <file path=ppt/theme/theme1.xml><?xml version="1.0" encoding="utf-8"?>
 <a:theme xmlns:a="http://schemas.openxmlformats.org/drawingml/2006/main" name="Office Theme">
   <a:themeElements>
-    <a:clrScheme name="Office">
+    <a:clrScheme name="Grayscale">
       <a:dk1>
         <a:sysClr val="windowText" lastClr="000000"/>
       </a:dk1>
@@ -4454,37 +4784,37 @@
         <a:sysClr val="window" lastClr="FFFFFF"/>
       </a:lt1>
       <a:dk2>
-        <a:srgbClr val="44546A"/>
+        <a:srgbClr val="000000"/>
       </a:dk2>
       <a:lt2>
-        <a:srgbClr val="E7E6E6"/>
+        <a:srgbClr val="F8F8F8"/>
       </a:lt2>
       <a:accent1>
-        <a:srgbClr val="5B9BD5"/>
+        <a:srgbClr val="DDDDDD"/>
       </a:accent1>
       <a:accent2>
-        <a:srgbClr val="ED7D31"/>
+        <a:srgbClr val="B2B2B2"/>
       </a:accent2>
       <a:accent3>
-        <a:srgbClr val="A5A5A5"/>
+        <a:srgbClr val="969696"/>
       </a:accent3>
       <a:accent4>
-        <a:srgbClr val="FFC000"/>
+        <a:srgbClr val="808080"/>
       </a:accent4>
       <a:accent5>
-        <a:srgbClr val="4472C4"/>
+        <a:srgbClr val="5F5F5F"/>
       </a:accent5>
       <a:accent6>
-        <a:srgbClr val="70AD47"/>
+        <a:srgbClr val="4D4D4D"/>
       </a:accent6>
       <a:hlink>
-        <a:srgbClr val="0563C1"/>
+        <a:srgbClr val="5F5F5F"/>
       </a:hlink>
       <a:folHlink>
-        <a:srgbClr val="954F72"/>
+        <a:srgbClr val="919191"/>
       </a:folHlink>
     </a:clrScheme>
-    <a:fontScheme name="Office">
+    <a:fontScheme name="Office Theme">
       <a:majorFont>
         <a:latin typeface="Calibri Light" panose="020F0302020204030204"/>
         <a:ea typeface=""/>
@@ -4556,7 +4886,7 @@
         <a:font script="Geor" typeface="Sylfaen"/>
       </a:minorFont>
     </a:fontScheme>
-    <a:fmtScheme name="Office">
+    <a:fmtScheme name="Office Theme">
       <a:fillStyleLst>
         <a:solidFill>
           <a:schemeClr val="phClr"/>
@@ -4698,7 +5028,7 @@
   <a:extraClrSchemeLst/>
   <a:extLst>
     <a:ext uri="{05A4C25C-085E-4340-85A3-A5531E510DB2}">
-      <thm15:themeFamily xmlns:thm15="http://schemas.microsoft.com/office/thememl/2012/main" name="Office Theme" id="{62F939B6-93AF-4DB8-9C6B-D6C7DFDC589F}" vid="{4A3C46E8-61CC-4603-A589-7422A47A8E4A}"/>
+      <thm15:themeFamily xmlns:thm15="http://schemas.microsoft.com/office/thememl/2012/main" name="Office Theme" id="{62F939B6-93AF-4DB8-9C6B-D6C7DFDC589F}" vid="{3E4F19A7-A959-40BB-972C-4880BAF8EB09}"/>
     </a:ext>
   </a:extLst>
 </a:theme>

</xml_diff>

<commit_message>
15/2/16 work completed at home
</commit_message>
<xml_diff>
--- a/BackgroundInfo/Template for my presentation.pptx
+++ b/BackgroundInfo/Template for my presentation.pptx
@@ -8,10 +8,10 @@
     <p:sldId id="256" r:id="rId2"/>
     <p:sldId id="257" r:id="rId3"/>
     <p:sldId id="275" r:id="rId4"/>
-    <p:sldId id="259" r:id="rId5"/>
-    <p:sldId id="261" r:id="rId6"/>
-    <p:sldId id="262" r:id="rId7"/>
-    <p:sldId id="258" r:id="rId8"/>
+    <p:sldId id="276" r:id="rId5"/>
+    <p:sldId id="259" r:id="rId6"/>
+    <p:sldId id="261" r:id="rId7"/>
+    <p:sldId id="262" r:id="rId8"/>
     <p:sldId id="260" r:id="rId9"/>
     <p:sldId id="263" r:id="rId10"/>
     <p:sldId id="264" r:id="rId11"/>
@@ -262,7 +262,7 @@
           <a:p>
             <a:fld id="{9D7F6470-0706-4AC3-9475-B1AD87F940D0}" type="datetimeFigureOut">
               <a:rPr lang="en-AU" smtClean="0"/>
-              <a:t>11/02/2016</a:t>
+              <a:t>15/02/2016</a:t>
             </a:fld>
             <a:endParaRPr lang="en-AU"/>
           </a:p>
@@ -432,7 +432,7 @@
           <a:p>
             <a:fld id="{9D7F6470-0706-4AC3-9475-B1AD87F940D0}" type="datetimeFigureOut">
               <a:rPr lang="en-AU" smtClean="0"/>
-              <a:t>11/02/2016</a:t>
+              <a:t>15/02/2016</a:t>
             </a:fld>
             <a:endParaRPr lang="en-AU"/>
           </a:p>
@@ -612,7 +612,7 @@
           <a:p>
             <a:fld id="{9D7F6470-0706-4AC3-9475-B1AD87F940D0}" type="datetimeFigureOut">
               <a:rPr lang="en-AU" smtClean="0"/>
-              <a:t>11/02/2016</a:t>
+              <a:t>15/02/2016</a:t>
             </a:fld>
             <a:endParaRPr lang="en-AU"/>
           </a:p>
@@ -782,7 +782,7 @@
           <a:p>
             <a:fld id="{9D7F6470-0706-4AC3-9475-B1AD87F940D0}" type="datetimeFigureOut">
               <a:rPr lang="en-AU" smtClean="0"/>
-              <a:t>11/02/2016</a:t>
+              <a:t>15/02/2016</a:t>
             </a:fld>
             <a:endParaRPr lang="en-AU"/>
           </a:p>
@@ -1028,7 +1028,7 @@
           <a:p>
             <a:fld id="{9D7F6470-0706-4AC3-9475-B1AD87F940D0}" type="datetimeFigureOut">
               <a:rPr lang="en-AU" smtClean="0"/>
-              <a:t>11/02/2016</a:t>
+              <a:t>15/02/2016</a:t>
             </a:fld>
             <a:endParaRPr lang="en-AU"/>
           </a:p>
@@ -1260,7 +1260,7 @@
           <a:p>
             <a:fld id="{9D7F6470-0706-4AC3-9475-B1AD87F940D0}" type="datetimeFigureOut">
               <a:rPr lang="en-AU" smtClean="0"/>
-              <a:t>11/02/2016</a:t>
+              <a:t>15/02/2016</a:t>
             </a:fld>
             <a:endParaRPr lang="en-AU"/>
           </a:p>
@@ -1627,7 +1627,7 @@
           <a:p>
             <a:fld id="{9D7F6470-0706-4AC3-9475-B1AD87F940D0}" type="datetimeFigureOut">
               <a:rPr lang="en-AU" smtClean="0"/>
-              <a:t>11/02/2016</a:t>
+              <a:t>15/02/2016</a:t>
             </a:fld>
             <a:endParaRPr lang="en-AU"/>
           </a:p>
@@ -1745,7 +1745,7 @@
           <a:p>
             <a:fld id="{9D7F6470-0706-4AC3-9475-B1AD87F940D0}" type="datetimeFigureOut">
               <a:rPr lang="en-AU" smtClean="0"/>
-              <a:t>11/02/2016</a:t>
+              <a:t>15/02/2016</a:t>
             </a:fld>
             <a:endParaRPr lang="en-AU"/>
           </a:p>
@@ -1840,7 +1840,7 @@
           <a:p>
             <a:fld id="{9D7F6470-0706-4AC3-9475-B1AD87F940D0}" type="datetimeFigureOut">
               <a:rPr lang="en-AU" smtClean="0"/>
-              <a:t>11/02/2016</a:t>
+              <a:t>15/02/2016</a:t>
             </a:fld>
             <a:endParaRPr lang="en-AU"/>
           </a:p>
@@ -2117,7 +2117,7 @@
           <a:p>
             <a:fld id="{9D7F6470-0706-4AC3-9475-B1AD87F940D0}" type="datetimeFigureOut">
               <a:rPr lang="en-AU" smtClean="0"/>
-              <a:t>11/02/2016</a:t>
+              <a:t>15/02/2016</a:t>
             </a:fld>
             <a:endParaRPr lang="en-AU"/>
           </a:p>
@@ -2374,7 +2374,7 @@
           <a:p>
             <a:fld id="{9D7F6470-0706-4AC3-9475-B1AD87F940D0}" type="datetimeFigureOut">
               <a:rPr lang="en-AU" smtClean="0"/>
-              <a:t>11/02/2016</a:t>
+              <a:t>15/02/2016</a:t>
             </a:fld>
             <a:endParaRPr lang="en-AU"/>
           </a:p>
@@ -2587,7 +2587,7 @@
           <a:p>
             <a:fld id="{9D7F6470-0706-4AC3-9475-B1AD87F940D0}" type="datetimeFigureOut">
               <a:rPr lang="en-AU" smtClean="0"/>
-              <a:t>11/02/2016</a:t>
+              <a:t>15/02/2016</a:t>
             </a:fld>
             <a:endParaRPr lang="en-AU"/>
           </a:p>
@@ -3166,7 +3166,56 @@
           <a:bodyPr/>
           <a:lstStyle/>
           <a:p>
-            <a:endParaRPr lang="en-AU"/>
+            <a:pPr marL="0" indent="0">
+              <a:buNone/>
+            </a:pPr>
+            <a:r>
+              <a:rPr lang="en-AU" dirty="0" smtClean="0"/>
+              <a:t>Cavin-1 mediates selective export of </a:t>
+            </a:r>
+            <a:r>
+              <a:rPr lang="en-AU" dirty="0" err="1" smtClean="0"/>
+              <a:t>miRNA</a:t>
+            </a:r>
+            <a:r>
+              <a:rPr lang="en-AU" dirty="0" smtClean="0"/>
+              <a:t> species into </a:t>
+            </a:r>
+            <a:r>
+              <a:rPr lang="en-AU" dirty="0" err="1" smtClean="0"/>
+              <a:t>exosomes</a:t>
+            </a:r>
+            <a:r>
+              <a:rPr lang="en-AU" dirty="0" smtClean="0"/>
+              <a:t>. </a:t>
+            </a:r>
+          </a:p>
+          <a:p>
+            <a:pPr marL="0" indent="0">
+              <a:buNone/>
+            </a:pPr>
+            <a:endParaRPr lang="en-AU" dirty="0"/>
+          </a:p>
+          <a:p>
+            <a:pPr marL="0" indent="0">
+              <a:buNone/>
+            </a:pPr>
+            <a:r>
+              <a:rPr lang="en-AU" dirty="0" smtClean="0"/>
+              <a:t>Chaperones and escort proteins are mediated by Cavin-1</a:t>
+            </a:r>
+          </a:p>
+          <a:p>
+            <a:pPr marL="0" indent="0">
+              <a:buNone/>
+            </a:pPr>
+            <a:endParaRPr lang="en-AU" dirty="0"/>
+          </a:p>
+          <a:p>
+            <a:pPr marL="0" indent="0">
+              <a:buNone/>
+            </a:pPr>
+            <a:endParaRPr lang="en-AU" dirty="0"/>
           </a:p>
         </p:txBody>
       </p:sp>
@@ -4037,13 +4086,68 @@
         <p:spPr>
           <a:xfrm>
             <a:off x="838200" y="1543731"/>
-            <a:ext cx="10515600" cy="4351338"/>
+            <a:ext cx="8722659" cy="4351338"/>
           </a:xfrm>
         </p:spPr>
         <p:txBody>
           <a:bodyPr/>
           <a:lstStyle/>
           <a:p>
+            <a:r>
+              <a:rPr lang="en-AU" dirty="0" smtClean="0"/>
+              <a:t>Second highest diagnosed cancer in males worldwide. </a:t>
+            </a:r>
+          </a:p>
+          <a:p>
+            <a:endParaRPr lang="en-AU" dirty="0" smtClean="0"/>
+          </a:p>
+          <a:p>
+            <a:r>
+              <a:rPr lang="en-AU" dirty="0" smtClean="0"/>
+              <a:t>1/3 of prostate cancer patients die</a:t>
+            </a:r>
+          </a:p>
+          <a:p>
+            <a:endParaRPr lang="en-AU" dirty="0" smtClean="0"/>
+          </a:p>
+          <a:p>
+            <a:r>
+              <a:rPr lang="en-AU" dirty="0" smtClean="0"/>
+              <a:t>Advanced prostate cancer yields metastasis to bone and lymph. </a:t>
+            </a:r>
+          </a:p>
+          <a:p>
+            <a:endParaRPr lang="en-AU" dirty="0" smtClean="0"/>
+          </a:p>
+          <a:p>
+            <a:r>
+              <a:rPr lang="en-AU" dirty="0" err="1" smtClean="0"/>
+              <a:t>Caveolin</a:t>
+            </a:r>
+            <a:r>
+              <a:rPr lang="en-AU" dirty="0" smtClean="0"/>
+              <a:t>/</a:t>
+            </a:r>
+            <a:r>
+              <a:rPr lang="en-AU" dirty="0" err="1" smtClean="0"/>
+              <a:t>cavin</a:t>
+            </a:r>
+            <a:r>
+              <a:rPr lang="en-AU" dirty="0" smtClean="0"/>
+              <a:t> system implemented in advanced prostate cancer and </a:t>
+            </a:r>
+            <a:r>
+              <a:rPr lang="en-AU" dirty="0" err="1" smtClean="0"/>
+              <a:t>exosome</a:t>
+            </a:r>
+            <a:r>
+              <a:rPr lang="en-AU" dirty="0" smtClean="0"/>
+              <a:t> cargo sortin</a:t>
+            </a:r>
+            <a:r>
+              <a:rPr lang="en-AU" dirty="0" smtClean="0"/>
+              <a:t>g. </a:t>
+            </a:r>
             <a:endParaRPr lang="en-AU" dirty="0"/>
           </a:p>
         </p:txBody>
@@ -4218,7 +4322,7 @@
         </p:blipFill>
         <p:spPr>
           <a:xfrm>
-            <a:off x="5638800" y="542246"/>
+            <a:off x="5808490" y="586923"/>
             <a:ext cx="5715000" cy="2857500"/>
           </a:xfrm>
           <a:prstGeom prst="rect">
@@ -4290,34 +4394,23 @@
             <p:ph type="title"/>
           </p:nvPr>
         </p:nvSpPr>
-        <p:spPr/>
-        <p:txBody>
-          <a:bodyPr/>
-          <a:lstStyle/>
-          <a:p>
-            <a:r>
-              <a:rPr lang="en-US" dirty="0" err="1" smtClean="0"/>
-              <a:t>Caveolae</a:t>
-            </a:r>
-            <a:r>
-              <a:rPr lang="en-US" dirty="0" smtClean="0"/>
-              <a:t>, </a:t>
-            </a:r>
-            <a:r>
-              <a:rPr lang="en-US" dirty="0" err="1" smtClean="0"/>
-              <a:t>Caveolins</a:t>
-            </a:r>
-            <a:r>
-              <a:rPr lang="en-US" dirty="0" smtClean="0"/>
-              <a:t> and </a:t>
-            </a:r>
-            <a:r>
-              <a:rPr lang="en-US" dirty="0" err="1" smtClean="0"/>
-              <a:t>Cavins</a:t>
-            </a:r>
-            <a:r>
-              <a:rPr lang="en-US" dirty="0" smtClean="0"/>
-              <a:t>. </a:t>
+        <p:spPr>
+          <a:xfrm>
+            <a:off x="838200" y="163419"/>
+            <a:ext cx="10515600" cy="1325563"/>
+          </a:xfrm>
+        </p:spPr>
+        <p:txBody>
+          <a:bodyPr/>
+          <a:lstStyle/>
+          <a:p>
+            <a:r>
+              <a:rPr lang="en-AU" dirty="0" err="1" smtClean="0"/>
+              <a:t>Exosomes</a:t>
+            </a:r>
+            <a:r>
+              <a:rPr lang="en-AU" dirty="0" smtClean="0"/>
+              <a:t> in Cancer. </a:t>
             </a:r>
             <a:endParaRPr lang="en-AU" dirty="0"/>
           </a:p>
@@ -4333,15 +4426,88 @@
             <p:ph idx="1"/>
           </p:nvPr>
         </p:nvSpPr>
-        <p:spPr/>
-        <p:txBody>
-          <a:bodyPr/>
-          <a:lstStyle/>
-          <a:p>
-            <a:r>
-              <a:rPr lang="en-US" dirty="0" smtClean="0"/>
-              <a:t>Introduce this system</a:t>
-            </a:r>
+        <p:spPr>
+          <a:xfrm>
+            <a:off x="703729" y="1287743"/>
+            <a:ext cx="7418294" cy="4351338"/>
+          </a:xfrm>
+        </p:spPr>
+        <p:txBody>
+          <a:bodyPr>
+            <a:normAutofit/>
+          </a:bodyPr>
+          <a:lstStyle/>
+          <a:p>
+            <a:pPr marL="0" indent="0">
+              <a:buNone/>
+            </a:pPr>
+            <a:r>
+              <a:rPr lang="en-AU" dirty="0" smtClean="0"/>
+              <a:t>Sequester RNAs, proteins and lipids. </a:t>
+            </a:r>
+          </a:p>
+          <a:p>
+            <a:pPr marL="0" indent="0">
+              <a:buNone/>
+            </a:pPr>
+            <a:endParaRPr lang="en-AU" dirty="0"/>
+          </a:p>
+          <a:p>
+            <a:pPr marL="0" indent="0">
+              <a:buNone/>
+            </a:pPr>
+            <a:r>
+              <a:rPr lang="en-AU" dirty="0" smtClean="0"/>
+              <a:t>Some reabsorption of </a:t>
+            </a:r>
+            <a:r>
+              <a:rPr lang="en-AU" dirty="0" err="1" smtClean="0"/>
+              <a:t>exosomes</a:t>
+            </a:r>
+            <a:r>
+              <a:rPr lang="en-AU" dirty="0" smtClean="0"/>
+              <a:t> can be targeted to particular cell types.</a:t>
+            </a:r>
+          </a:p>
+          <a:p>
+            <a:pPr marL="444500" indent="-176213">
+              <a:buNone/>
+            </a:pPr>
+            <a:r>
+              <a:rPr lang="en-AU" dirty="0" smtClean="0"/>
+              <a:t>In prostate cancer, homing proteins had been found.</a:t>
+            </a:r>
+          </a:p>
+          <a:p>
+            <a:pPr marL="0" indent="0">
+              <a:buNone/>
+            </a:pPr>
+            <a:endParaRPr lang="en-AU" dirty="0"/>
+          </a:p>
+          <a:p>
+            <a:pPr marL="0" indent="0">
+              <a:buNone/>
+            </a:pPr>
+            <a:r>
+              <a:rPr lang="en-AU" dirty="0" err="1" smtClean="0"/>
+              <a:t>Exosomes</a:t>
+            </a:r>
+            <a:r>
+              <a:rPr lang="en-AU" dirty="0" smtClean="0"/>
+              <a:t> implemented in establishing pre-metastatic niche. </a:t>
+            </a:r>
+            <a:endParaRPr lang="en-AU" dirty="0"/>
+          </a:p>
+          <a:p>
+            <a:pPr marL="0" indent="0">
+              <a:buNone/>
+            </a:pPr>
+            <a:endParaRPr lang="en-AU" dirty="0"/>
+          </a:p>
+          <a:p>
+            <a:pPr marL="0" indent="0">
+              <a:buNone/>
+            </a:pPr>
             <a:endParaRPr lang="en-AU" dirty="0"/>
           </a:p>
         </p:txBody>
@@ -4349,20 +4515,13 @@
     </p:spTree>
     <p:extLst>
       <p:ext uri="{BB962C8B-B14F-4D97-AF65-F5344CB8AC3E}">
-        <p14:creationId xmlns:p14="http://schemas.microsoft.com/office/powerpoint/2010/main" val="4268105612"/>
+        <p14:creationId xmlns:p14="http://schemas.microsoft.com/office/powerpoint/2010/main" val="1055551161"/>
       </p:ext>
     </p:extLst>
   </p:cSld>
   <p:clrMapOvr>
     <a:masterClrMapping/>
   </p:clrMapOvr>
-  <p:timing>
-    <p:tnLst>
-      <p:par>
-        <p:cTn id="1" dur="indefinite" restart="never" nodeType="tmRoot"/>
-      </p:par>
-    </p:tnLst>
-  </p:timing>
 </p:sld>
 </file>
 
@@ -4400,8 +4559,28 @@
           <a:p>
             <a:r>
               <a:rPr lang="en-US" dirty="0" err="1" smtClean="0"/>
+              <a:t>Caveolae</a:t>
+            </a:r>
+            <a:r>
+              <a:rPr lang="en-US" dirty="0" smtClean="0"/>
+              <a:t>, </a:t>
+            </a:r>
+            <a:r>
+              <a:rPr lang="en-US" dirty="0" err="1" smtClean="0"/>
               <a:t>Caveolins</a:t>
             </a:r>
+            <a:r>
+              <a:rPr lang="en-US" dirty="0" smtClean="0"/>
+              <a:t> and </a:t>
+            </a:r>
+            <a:r>
+              <a:rPr lang="en-US" dirty="0" err="1" smtClean="0"/>
+              <a:t>Cavins</a:t>
+            </a:r>
+            <a:r>
+              <a:rPr lang="en-US" dirty="0" smtClean="0"/>
+              <a:t>. </a:t>
+            </a:r>
             <a:endParaRPr lang="en-AU" dirty="0"/>
           </a:p>
         </p:txBody>
@@ -4416,19 +4595,28 @@
             <p:ph idx="1"/>
           </p:nvPr>
         </p:nvSpPr>
-        <p:spPr/>
-        <p:txBody>
-          <a:bodyPr/>
-          <a:lstStyle/>
-          <a:p>
-            <a:endParaRPr lang="en-AU"/>
+        <p:spPr>
+          <a:xfrm>
+            <a:off x="838200" y="1559859"/>
+            <a:ext cx="10515600" cy="4617104"/>
+          </a:xfrm>
+        </p:spPr>
+        <p:txBody>
+          <a:bodyPr/>
+          <a:lstStyle/>
+          <a:p>
+            <a:r>
+              <a:rPr lang="en-US" dirty="0" smtClean="0"/>
+              <a:t>Introduce this system</a:t>
+            </a:r>
+            <a:endParaRPr lang="en-AU" dirty="0"/>
           </a:p>
         </p:txBody>
       </p:sp>
     </p:spTree>
     <p:extLst>
       <p:ext uri="{BB962C8B-B14F-4D97-AF65-F5344CB8AC3E}">
-        <p14:creationId xmlns:p14="http://schemas.microsoft.com/office/powerpoint/2010/main" val="851287208"/>
+        <p14:creationId xmlns:p14="http://schemas.microsoft.com/office/powerpoint/2010/main" val="4268105612"/>
       </p:ext>
     </p:extLst>
   </p:cSld>
@@ -4479,7 +4667,7 @@
           <a:p>
             <a:r>
               <a:rPr lang="en-US" dirty="0" err="1" smtClean="0"/>
-              <a:t>Cavins</a:t>
+              <a:t>Caveolins</a:t>
             </a:r>
             <a:endParaRPr lang="en-AU" dirty="0"/>
           </a:p>
@@ -4507,7 +4695,7 @@
     </p:spTree>
     <p:extLst>
       <p:ext uri="{BB962C8B-B14F-4D97-AF65-F5344CB8AC3E}">
-        <p14:creationId xmlns:p14="http://schemas.microsoft.com/office/powerpoint/2010/main" val="2804912544"/>
+        <p14:creationId xmlns:p14="http://schemas.microsoft.com/office/powerpoint/2010/main" val="851287208"/>
       </p:ext>
     </p:extLst>
   </p:cSld>
@@ -4557,8 +4745,8 @@
           <a:lstStyle/>
           <a:p>
             <a:r>
-              <a:rPr lang="en-US" dirty="0" smtClean="0"/>
-              <a:t>Exosomes/ECVs in cancer</a:t>
+              <a:rPr lang="en-US" dirty="0" err="1" smtClean="0"/>
+              <a:t>Cavins</a:t>
             </a:r>
             <a:endParaRPr lang="en-AU" dirty="0"/>
           </a:p>
@@ -4579,14 +4767,14 @@
           <a:bodyPr/>
           <a:lstStyle/>
           <a:p>
-            <a:endParaRPr lang="en-AU" dirty="0"/>
+            <a:endParaRPr lang="en-AU"/>
           </a:p>
         </p:txBody>
       </p:sp>
     </p:spTree>
     <p:extLst>
       <p:ext uri="{BB962C8B-B14F-4D97-AF65-F5344CB8AC3E}">
-        <p14:creationId xmlns:p14="http://schemas.microsoft.com/office/powerpoint/2010/main" val="238393214"/>
+        <p14:creationId xmlns:p14="http://schemas.microsoft.com/office/powerpoint/2010/main" val="2804912544"/>
       </p:ext>
     </p:extLst>
   </p:cSld>
@@ -4670,7 +4858,7 @@
           <a:bodyPr/>
           <a:lstStyle/>
           <a:p>
-            <a:endParaRPr lang="en-AU"/>
+            <a:endParaRPr lang="en-AU" dirty="0"/>
           </a:p>
         </p:txBody>
       </p:sp>

</xml_diff>